<commit_message>
Updated content for Vancouver Web Camp.
</commit_message>
<xml_diff>
--- a/decks/1 - Keynote.pptx
+++ b/decks/1 - Keynote.pptx
@@ -363,7 +363,7 @@
           <a:p>
             <a:fld id="{D7912463-2EB7-42C0-8AD4-F0A02C6EC2BF}" type="datetimeFigureOut">
               <a:rPr lang="en-US" smtClean="0"/>
-              <a:t>4/25/2015</a:t>
+              <a:t>5/29/2015</a:t>
             </a:fld>
             <a:endParaRPr lang="en-US"/>
           </a:p>
@@ -1594,7 +1594,7 @@
           <a:p>
             <a:fld id="{52D70B41-4299-45C5-AD35-6E608BA0CA1D}" type="datetime1">
               <a:rPr lang="en-US" smtClean="0"/>
-              <a:t>4/25/2015</a:t>
+              <a:t>5/29/2015</a:t>
             </a:fld>
             <a:endParaRPr lang="en-US"/>
           </a:p>
@@ -1775,7 +1775,7 @@
           <a:p>
             <a:fld id="{8861AF46-04D6-4398-9815-53B63CCB5B13}" type="datetime1">
               <a:rPr lang="en-US" smtClean="0"/>
-              <a:t>4/25/2015</a:t>
+              <a:t>5/29/2015</a:t>
             </a:fld>
             <a:endParaRPr lang="en-US"/>
           </a:p>
@@ -1966,7 +1966,7 @@
           <a:p>
             <a:fld id="{53F376DB-5A6E-4BE7-A956-6AEC50466D77}" type="datetime1">
               <a:rPr lang="en-US" smtClean="0"/>
-              <a:t>4/25/2015</a:t>
+              <a:t>5/29/2015</a:t>
             </a:fld>
             <a:endParaRPr lang="en-US"/>
           </a:p>
@@ -2121,7 +2121,7 @@
           <a:p>
             <a:fld id="{C1BFF85C-EB9E-4166-9BA3-843B860C759E}" type="datetime1">
               <a:rPr lang="en-US" smtClean="0"/>
-              <a:t>4/25/2015</a:t>
+              <a:t>5/29/2015</a:t>
             </a:fld>
             <a:endParaRPr lang="en-US"/>
           </a:p>
@@ -2252,7 +2252,7 @@
           <a:p>
             <a:fld id="{C2AB4B73-BA70-4D28-96A3-63B1679E5C75}" type="datetime1">
               <a:rPr lang="en-US" smtClean="0"/>
-              <a:t>4/25/2015</a:t>
+              <a:t>5/29/2015</a:t>
             </a:fld>
             <a:endParaRPr lang="en-US"/>
           </a:p>
@@ -2617,7 +2617,7 @@
           <a:p>
             <a:fld id="{707B1C11-3612-481A-A4DE-E94E2CB79C9D}" type="datetime1">
               <a:rPr lang="en-US" smtClean="0"/>
-              <a:t>4/25/2015</a:t>
+              <a:t>5/29/2015</a:t>
             </a:fld>
             <a:endParaRPr lang="en-US"/>
           </a:p>
@@ -2874,7 +2874,7 @@
           <a:p>
             <a:fld id="{E436052A-34FB-45BF-B898-C7214B38FB03}" type="datetime1">
               <a:rPr lang="en-US" smtClean="0"/>
-              <a:t>4/25/2015</a:t>
+              <a:t>5/29/2015</a:t>
             </a:fld>
             <a:endParaRPr lang="en-US"/>
           </a:p>
@@ -3117,7 +3117,7 @@
           <a:p>
             <a:fld id="{568CA7AB-B18F-4114-9C41-07B8434DCA06}" type="datetime1">
               <a:rPr lang="en-US" smtClean="0"/>
-              <a:t>4/25/2015</a:t>
+              <a:t>5/29/2015</a:t>
             </a:fld>
             <a:endParaRPr lang="en-US"/>
           </a:p>
@@ -3495,7 +3495,7 @@
           <a:p>
             <a:fld id="{3B6E3DCF-DC8B-436B-B421-CB56A1A6E95B}" type="datetime1">
               <a:rPr lang="en-US" smtClean="0"/>
-              <a:t>4/25/2015</a:t>
+              <a:t>5/29/2015</a:t>
             </a:fld>
             <a:endParaRPr lang="en-US"/>
           </a:p>
@@ -3624,7 +3624,7 @@
           <a:p>
             <a:fld id="{461949CD-CEF4-4127-8F80-97533F9EBD97}" type="datetime1">
               <a:rPr lang="en-US" smtClean="0"/>
-              <a:t>4/25/2015</a:t>
+              <a:t>5/29/2015</a:t>
             </a:fld>
             <a:endParaRPr lang="en-US"/>
           </a:p>
@@ -3730,7 +3730,7 @@
           <a:p>
             <a:fld id="{D6F8A408-4BAB-4897-9BA2-ECF2424C7074}" type="datetime1">
               <a:rPr lang="en-US" smtClean="0"/>
-              <a:t>4/25/2015</a:t>
+              <a:t>5/29/2015</a:t>
             </a:fld>
             <a:endParaRPr lang="en-US"/>
           </a:p>
@@ -4018,7 +4018,7 @@
           <a:p>
             <a:fld id="{45928B14-3621-4E7D-8C88-E8539AF88EB9}" type="datetime1">
               <a:rPr lang="en-US" smtClean="0"/>
-              <a:t>4/25/2015</a:t>
+              <a:t>5/29/2015</a:t>
             </a:fld>
             <a:endParaRPr lang="en-US"/>
           </a:p>
@@ -4279,7 +4279,7 @@
           <a:p>
             <a:fld id="{3ACAB7DE-9600-47D8-A3C9-19BF307914AD}" type="datetime1">
               <a:rPr lang="en-US" smtClean="0"/>
-              <a:t>4/25/2015</a:t>
+              <a:t>5/29/2015</a:t>
             </a:fld>
             <a:endParaRPr lang="en-US"/>
           </a:p>
@@ -4496,7 +4496,7 @@
           <a:p>
             <a:fld id="{2A6863E3-FCA6-4E52-85FD-BD23ECBC3395}" type="datetime1">
               <a:rPr lang="en-US" smtClean="0"/>
-              <a:t>4/25/2015</a:t>
+              <a:t>5/29/2015</a:t>
             </a:fld>
             <a:endParaRPr lang="en-US"/>
           </a:p>
@@ -27364,7 +27364,12 @@
             <p:ph type="subTitle" idx="1"/>
           </p:nvPr>
         </p:nvSpPr>
-        <p:spPr/>
+        <p:spPr>
+          <a:xfrm>
+            <a:off x="723900" y="3602038"/>
+            <a:ext cx="10744200" cy="1655762"/>
+          </a:xfrm>
+        </p:spPr>
         <p:txBody>
           <a:bodyPr>
             <a:normAutofit fontScale="92500" lnSpcReduction="20000"/>
@@ -27547,7 +27552,7 @@
         <p:spPr/>
         <p:txBody>
           <a:bodyPr>
-            <a:normAutofit lnSpcReduction="10000"/>
+            <a:normAutofit fontScale="92500" lnSpcReduction="10000"/>
           </a:bodyPr>
           <a:lstStyle/>
           <a:p>
@@ -29573,18 +29578,18 @@
 </file>
 
 <file path=customXml/item1.xml><?xml version="1.0" encoding="utf-8"?>
+<p:properties xmlns:p="http://schemas.microsoft.com/office/2006/metadata/properties" xmlns:xsi="http://www.w3.org/2001/XMLSchema-instance" xmlns:pc="http://schemas.microsoft.com/office/infopath/2007/PartnerControls">
+  <documentManagement/>
+</p:properties>
+</file>
+
+<file path=customXml/item2.xml><?xml version="1.0" encoding="utf-8"?>
 <?mso-contentType ?>
 <FormTemplates xmlns="http://schemas.microsoft.com/sharepoint/v3/contenttype/forms">
   <Display>DocumentLibraryForm</Display>
   <Edit>DocumentLibraryForm</Edit>
   <New>DocumentLibraryForm</New>
 </FormTemplates>
-</file>
-
-<file path=customXml/item2.xml><?xml version="1.0" encoding="utf-8"?>
-<p:properties xmlns:p="http://schemas.microsoft.com/office/2006/metadata/properties" xmlns:xsi="http://www.w3.org/2001/XMLSchema-instance" xmlns:pc="http://schemas.microsoft.com/office/infopath/2007/PartnerControls">
-  <documentManagement/>
-</p:properties>
 </file>
 
 <file path=customXml/item3.xml><?xml version="1.0" encoding="utf-8"?>
@@ -29728,14 +29733,6 @@
 </file>
 
 <file path=customXml/itemProps1.xml><?xml version="1.0" encoding="utf-8"?>
-<ds:datastoreItem xmlns:ds="http://schemas.openxmlformats.org/officeDocument/2006/customXml" ds:itemID="{FED2B90E-7551-4737-913C-9E5D5CFD0995}">
-  <ds:schemaRefs>
-    <ds:schemaRef ds:uri="http://schemas.microsoft.com/sharepoint/v3/contenttype/forms"/>
-  </ds:schemaRefs>
-</ds:datastoreItem>
-</file>
-
-<file path=customXml/itemProps2.xml><?xml version="1.0" encoding="utf-8"?>
 <ds:datastoreItem xmlns:ds="http://schemas.openxmlformats.org/officeDocument/2006/customXml" ds:itemID="{B91D0F85-582A-44D6-AD1E-4CB486C41569}">
   <ds:schemaRefs>
     <ds:schemaRef ds:uri="http://purl.org/dc/terms/"/>
@@ -29747,6 +29744,14 @@
     <ds:schemaRef ds:uri="dff2e961-dbd1-4b6a-ab85-d84f915edb70"/>
     <ds:schemaRef ds:uri="http://www.w3.org/XML/1998/namespace"/>
     <ds:schemaRef ds:uri="http://purl.org/dc/elements/1.1/"/>
+  </ds:schemaRefs>
+</ds:datastoreItem>
+</file>
+
+<file path=customXml/itemProps2.xml><?xml version="1.0" encoding="utf-8"?>
+<ds:datastoreItem xmlns:ds="http://schemas.openxmlformats.org/officeDocument/2006/customXml" ds:itemID="{FED2B90E-7551-4737-913C-9E5D5CFD0995}">
+  <ds:schemaRefs>
+    <ds:schemaRef ds:uri="http://schemas.microsoft.com/sharepoint/v3/contenttype/forms"/>
   </ds:schemaRefs>
 </ds:datastoreItem>
 </file>

</xml_diff>